<commit_message>
Add changes to the presentation
</commit_message>
<xml_diff>
--- a/Food Waste Prediction.pptx
+++ b/Food Waste Prediction.pptx
@@ -10597,7 +10597,7 @@
                       </a:pPr>
                       <a:r>
                         <a:rPr lang="en-US" sz="1400" b="1"/>
-                        <a:t>Waste</a:t>
+                        <a:t>Difference</a:t>
                       </a:r>
                       <a:endParaRPr lang="en-US" sz="1400" b="1"/>
                     </a:p>
@@ -11547,8 +11547,8 @@
         </p:nvSpPr>
         <p:spPr>
           <a:xfrm>
-            <a:off x="4080828" y="3825240"/>
-            <a:ext cx="1227455" cy="491490"/>
+            <a:off x="3868103" y="3825240"/>
+            <a:ext cx="1652905" cy="491490"/>
           </a:xfrm>
           <a:prstGeom prst="rect">
             <a:avLst/>
@@ -11575,7 +11575,7 @@
             <a:pPr algn="ctr"/>
             <a:r>
               <a:rPr lang="en-US" sz="1400" b="1"/>
-              <a:t>on the date</a:t>
+              <a:t>on the same date</a:t>
             </a:r>
             <a:endParaRPr lang="en-US" sz="1400" b="1"/>
           </a:p>

</xml_diff>